<commit_message>
Removed extra bracket from cheatsheet 'Create DataFrame with a MultiIndex' code example.
</commit_message>
<xml_diff>
--- a/doc/cheatsheet/Pandas_Cheat_Sheet.pptx
+++ b/doc/cheatsheet/Pandas_Cheat_Sheet.pptx
@@ -255,7 +255,7 @@
           <a:p>
             <a:fld id="{79278B33-2949-49BE-B3B0-3F16CAF906FE}" type="datetimeFigureOut">
               <a:rPr lang="en-US" smtClean="0"/>
-              <a:t>3/15/2018</a:t>
+              <a:t>2/6/2019</a:t>
             </a:fld>
             <a:endParaRPr lang="en-US"/>
           </a:p>
@@ -425,7 +425,7 @@
           <a:p>
             <a:fld id="{79278B33-2949-49BE-B3B0-3F16CAF906FE}" type="datetimeFigureOut">
               <a:rPr lang="en-US" smtClean="0"/>
-              <a:t>3/15/2018</a:t>
+              <a:t>2/6/2019</a:t>
             </a:fld>
             <a:endParaRPr lang="en-US"/>
           </a:p>
@@ -605,7 +605,7 @@
           <a:p>
             <a:fld id="{79278B33-2949-49BE-B3B0-3F16CAF906FE}" type="datetimeFigureOut">
               <a:rPr lang="en-US" smtClean="0"/>
-              <a:t>3/15/2018</a:t>
+              <a:t>2/6/2019</a:t>
             </a:fld>
             <a:endParaRPr lang="en-US"/>
           </a:p>
@@ -775,7 +775,7 @@
           <a:p>
             <a:fld id="{79278B33-2949-49BE-B3B0-3F16CAF906FE}" type="datetimeFigureOut">
               <a:rPr lang="en-US" smtClean="0"/>
-              <a:t>3/15/2018</a:t>
+              <a:t>2/6/2019</a:t>
             </a:fld>
             <a:endParaRPr lang="en-US"/>
           </a:p>
@@ -1019,7 +1019,7 @@
           <a:p>
             <a:fld id="{79278B33-2949-49BE-B3B0-3F16CAF906FE}" type="datetimeFigureOut">
               <a:rPr lang="en-US" smtClean="0"/>
-              <a:t>3/15/2018</a:t>
+              <a:t>2/6/2019</a:t>
             </a:fld>
             <a:endParaRPr lang="en-US"/>
           </a:p>
@@ -1251,7 +1251,7 @@
           <a:p>
             <a:fld id="{79278B33-2949-49BE-B3B0-3F16CAF906FE}" type="datetimeFigureOut">
               <a:rPr lang="en-US" smtClean="0"/>
-              <a:t>3/15/2018</a:t>
+              <a:t>2/6/2019</a:t>
             </a:fld>
             <a:endParaRPr lang="en-US"/>
           </a:p>
@@ -1618,7 +1618,7 @@
           <a:p>
             <a:fld id="{79278B33-2949-49BE-B3B0-3F16CAF906FE}" type="datetimeFigureOut">
               <a:rPr lang="en-US" smtClean="0"/>
-              <a:t>3/15/2018</a:t>
+              <a:t>2/6/2019</a:t>
             </a:fld>
             <a:endParaRPr lang="en-US"/>
           </a:p>
@@ -1736,7 +1736,7 @@
           <a:p>
             <a:fld id="{79278B33-2949-49BE-B3B0-3F16CAF906FE}" type="datetimeFigureOut">
               <a:rPr lang="en-US" smtClean="0"/>
-              <a:t>3/15/2018</a:t>
+              <a:t>2/6/2019</a:t>
             </a:fld>
             <a:endParaRPr lang="en-US"/>
           </a:p>
@@ -1831,7 +1831,7 @@
           <a:p>
             <a:fld id="{79278B33-2949-49BE-B3B0-3F16CAF906FE}" type="datetimeFigureOut">
               <a:rPr lang="en-US" smtClean="0"/>
-              <a:t>3/15/2018</a:t>
+              <a:t>2/6/2019</a:t>
             </a:fld>
             <a:endParaRPr lang="en-US"/>
           </a:p>
@@ -2108,7 +2108,7 @@
           <a:p>
             <a:fld id="{79278B33-2949-49BE-B3B0-3F16CAF906FE}" type="datetimeFigureOut">
               <a:rPr lang="en-US" smtClean="0"/>
-              <a:t>3/15/2018</a:t>
+              <a:t>2/6/2019</a:t>
             </a:fld>
             <a:endParaRPr lang="en-US"/>
           </a:p>
@@ -2365,7 +2365,7 @@
           <a:p>
             <a:fld id="{79278B33-2949-49BE-B3B0-3F16CAF906FE}" type="datetimeFigureOut">
               <a:rPr lang="en-US" smtClean="0"/>
-              <a:t>3/15/2018</a:t>
+              <a:t>2/6/2019</a:t>
             </a:fld>
             <a:endParaRPr lang="en-US"/>
           </a:p>
@@ -2578,7 +2578,7 @@
           <a:p>
             <a:fld id="{79278B33-2949-49BE-B3B0-3F16CAF906FE}" type="datetimeFigureOut">
               <a:rPr lang="en-US" smtClean="0"/>
-              <a:t>3/15/2018</a:t>
+              <a:t>2/6/2019</a:t>
             </a:fld>
             <a:endParaRPr lang="en-US"/>
           </a:p>
@@ -11332,14 +11332,14 @@
           <a:effectLst/>
           <a:extLst>
             <a:ext uri="{909E8E84-426E-40dd-AFC4-6F175D3DCCD1}">
-              <a14:hiddenFill xmlns:a14="http://schemas.microsoft.com/office/drawing/2010/main" xmlns="">
+              <a14:hiddenFill xmlns="" xmlns:a14="http://schemas.microsoft.com/office/drawing/2010/main">
                 <a:solidFill>
                   <a:schemeClr val="accent1"/>
                 </a:solidFill>
               </a14:hiddenFill>
             </a:ext>
             <a:ext uri="{91240B29-F687-4f45-9708-019B960494DF}">
-              <a14:hiddenLine xmlns:a14="http://schemas.microsoft.com/office/drawing/2010/main" xmlns="" w="9525">
+              <a14:hiddenLine xmlns="" xmlns:a14="http://schemas.microsoft.com/office/drawing/2010/main" w="9525">
                 <a:solidFill>
                   <a:schemeClr val="tx1"/>
                 </a:solidFill>
@@ -11349,7 +11349,7 @@
               </a14:hiddenLine>
             </a:ext>
             <a:ext uri="{AF507438-7753-43e0-B8FC-AC1667EBCBE1}">
-              <a14:hiddenEffects xmlns:a14="http://schemas.microsoft.com/office/drawing/2010/main" xmlns="">
+              <a14:hiddenEffects xmlns="" xmlns:a14="http://schemas.microsoft.com/office/drawing/2010/main">
                 <a:effectLst>
                   <a:outerShdw dist="35921" dir="2700000" algn="ctr" rotWithShape="0">
                     <a:schemeClr val="bg2"/>
@@ -11514,11 +11514,14 @@
               <a:t>n','v</a:t>
             </a:r>
             <a:r>
-              <a:rPr lang="en-US" sz="1200" b="1" dirty="0">
-                <a:latin typeface="Consolas" panose="020B0609020204030204" pitchFamily="49" charset="0"/>
-              </a:rPr>
-              <a:t>'])))</a:t>
-            </a:r>
+              <a:rPr lang="en-US" sz="1200" b="1">
+                <a:latin typeface="Consolas" panose="020B0609020204030204" pitchFamily="49" charset="0"/>
+              </a:rPr>
+              <a:t>']))</a:t>
+            </a:r>
+            <a:endParaRPr lang="en-US" sz="1200" b="1" dirty="0">
+              <a:latin typeface="Consolas" panose="020B0609020204030204" pitchFamily="49" charset="0"/>
+            </a:endParaRPr>
           </a:p>
           <a:p>
             <a:r>

</xml_diff>